<commit_message>
Update Project 3- World Data Population.pptx
</commit_message>
<xml_diff>
--- a/Project 3- World Data Population.pptx
+++ b/Project 3- World Data Population.pptx
@@ -872,7 +872,7 @@
   <pc:docChgLst>
     <pc:chgData name="Nelson Linarez" userId="73a424aa0dbfbcb4" providerId="LiveId" clId="{181C7474-A5D7-4624-82D8-40158F6A7E7E}"/>
     <pc:docChg chg="custSel modSld">
-      <pc:chgData name="Nelson Linarez" userId="73a424aa0dbfbcb4" providerId="LiveId" clId="{181C7474-A5D7-4624-82D8-40158F6A7E7E}" dt="2023-07-21T00:36:06.176" v="209" actId="20577"/>
+      <pc:chgData name="Nelson Linarez" userId="73a424aa0dbfbcb4" providerId="LiveId" clId="{181C7474-A5D7-4624-82D8-40158F6A7E7E}" dt="2023-07-26T01:31:13.930" v="226" actId="20577"/>
       <pc:docMkLst>
         <pc:docMk/>
       </pc:docMkLst>
@@ -891,8 +891,23 @@
           </ac:spMkLst>
         </pc:spChg>
       </pc:sldChg>
+      <pc:sldChg chg="modSp mod">
+        <pc:chgData name="Nelson Linarez" userId="73a424aa0dbfbcb4" providerId="LiveId" clId="{181C7474-A5D7-4624-82D8-40158F6A7E7E}" dt="2023-07-26T01:29:15.012" v="213" actId="20577"/>
+        <pc:sldMkLst>
+          <pc:docMk/>
+          <pc:sldMk cId="0" sldId="258"/>
+        </pc:sldMkLst>
+        <pc:spChg chg="mod">
+          <ac:chgData name="Nelson Linarez" userId="73a424aa0dbfbcb4" providerId="LiveId" clId="{181C7474-A5D7-4624-82D8-40158F6A7E7E}" dt="2023-07-26T01:29:15.012" v="213" actId="20577"/>
+          <ac:spMkLst>
+            <pc:docMk/>
+            <pc:sldMk cId="0" sldId="258"/>
+            <ac:spMk id="142" creationId="{00000000-0000-0000-0000-000000000000}"/>
+          </ac:spMkLst>
+        </pc:spChg>
+      </pc:sldChg>
       <pc:sldChg chg="addSp delSp modSp mod">
-        <pc:chgData name="Nelson Linarez" userId="73a424aa0dbfbcb4" providerId="LiveId" clId="{181C7474-A5D7-4624-82D8-40158F6A7E7E}" dt="2023-07-21T00:36:06.176" v="209" actId="20577"/>
+        <pc:chgData name="Nelson Linarez" userId="73a424aa0dbfbcb4" providerId="LiveId" clId="{181C7474-A5D7-4624-82D8-40158F6A7E7E}" dt="2023-07-26T01:30:35.899" v="217" actId="1076"/>
         <pc:sldMkLst>
           <pc:docMk/>
           <pc:sldMk cId="0" sldId="262"/>
@@ -906,7 +921,7 @@
           </ac:spMkLst>
         </pc:spChg>
         <pc:picChg chg="add mod">
-          <ac:chgData name="Nelson Linarez" userId="73a424aa0dbfbcb4" providerId="LiveId" clId="{181C7474-A5D7-4624-82D8-40158F6A7E7E}" dt="2023-07-21T00:24:38.957" v="65" actId="1076"/>
+          <ac:chgData name="Nelson Linarez" userId="73a424aa0dbfbcb4" providerId="LiveId" clId="{181C7474-A5D7-4624-82D8-40158F6A7E7E}" dt="2023-07-26T01:30:35.899" v="217" actId="1076"/>
           <ac:picMkLst>
             <pc:docMk/>
             <pc:sldMk cId="0" sldId="262"/>
@@ -919,6 +934,36 @@
             <pc:docMk/>
             <pc:sldMk cId="0" sldId="262"/>
             <ac:picMk id="172" creationId="{00000000-0000-0000-0000-000000000000}"/>
+          </ac:picMkLst>
+        </pc:picChg>
+      </pc:sldChg>
+      <pc:sldChg chg="modSp mod">
+        <pc:chgData name="Nelson Linarez" userId="73a424aa0dbfbcb4" providerId="LiveId" clId="{181C7474-A5D7-4624-82D8-40158F6A7E7E}" dt="2023-07-26T01:31:13.930" v="226" actId="20577"/>
+        <pc:sldMkLst>
+          <pc:docMk/>
+          <pc:sldMk cId="2568645975" sldId="264"/>
+        </pc:sldMkLst>
+        <pc:spChg chg="mod">
+          <ac:chgData name="Nelson Linarez" userId="73a424aa0dbfbcb4" providerId="LiveId" clId="{181C7474-A5D7-4624-82D8-40158F6A7E7E}" dt="2023-07-26T01:31:13.930" v="226" actId="20577"/>
+          <ac:spMkLst>
+            <pc:docMk/>
+            <pc:sldMk cId="2568645975" sldId="264"/>
+            <ac:spMk id="5" creationId="{40D83849-C8C8-8ECC-62B1-05AED6E410B7}"/>
+          </ac:spMkLst>
+        </pc:spChg>
+      </pc:sldChg>
+      <pc:sldChg chg="modSp mod">
+        <pc:chgData name="Nelson Linarez" userId="73a424aa0dbfbcb4" providerId="LiveId" clId="{181C7474-A5D7-4624-82D8-40158F6A7E7E}" dt="2023-07-26T01:30:24.077" v="215" actId="167"/>
+        <pc:sldMkLst>
+          <pc:docMk/>
+          <pc:sldMk cId="1525494949" sldId="265"/>
+        </pc:sldMkLst>
+        <pc:picChg chg="mod ord">
+          <ac:chgData name="Nelson Linarez" userId="73a424aa0dbfbcb4" providerId="LiveId" clId="{181C7474-A5D7-4624-82D8-40158F6A7E7E}" dt="2023-07-26T01:30:24.077" v="215" actId="167"/>
+          <ac:picMkLst>
+            <pc:docMk/>
+            <pc:sldMk cId="1525494949" sldId="265"/>
+            <ac:picMk id="3" creationId="{76D52324-9C35-195F-C77C-B58996F69245}"/>
           </ac:picMkLst>
         </pc:picChg>
       </pc:sldChg>
@@ -12637,7 +12682,7 @@
             </a:pPr>
             <a:r>
               <a:rPr lang="en-US" sz="1100" dirty="0"/>
-              <a:t>Three unique views with user-driven interaction</a:t>
+              <a:t>Four unique views with user-driven interaction</a:t>
             </a:r>
           </a:p>
           <a:p>
@@ -16497,7 +16542,7 @@
               </a:spcAft>
             </a:pPr>
             <a:r>
-              <a:rPr lang="en-US" sz="3100" b="1"/>
+              <a:rPr lang="en-US" sz="3100" b="1" dirty="0"/>
               <a:t>POPULATION BUBBLE MAP</a:t>
             </a:r>
           </a:p>
@@ -16652,7 +16697,7 @@
         </p:blipFill>
         <p:spPr>
           <a:xfrm>
-            <a:off x="20" y="10"/>
+            <a:off x="-9344" y="-6350"/>
             <a:ext cx="4046200" cy="5143490"/>
           </a:xfrm>
           <a:custGeom>
@@ -16790,7 +16835,7 @@
         <p:spPr>
           <a:xfrm>
             <a:off x="225778" y="338667"/>
-            <a:ext cx="8128000" cy="3846117"/>
+            <a:ext cx="7156329" cy="4289316"/>
           </a:xfrm>
           <a:prstGeom prst="rect">
             <a:avLst/>
@@ -16901,7 +16946,7 @@
                   </a:schemeClr>
                 </a:solidFill>
               </a:rPr>
-              <a:t>Most Common Language in Americas: English</a:t>
+              <a:t>Most Common Language in the Americas: English</a:t>
             </a:r>
           </a:p>
           <a:p>
@@ -17105,7 +17150,7 @@
                   </a:schemeClr>
                 </a:solidFill>
               </a:rPr>
-              <a:t>Most Common Language in Antarctic: English</a:t>
+              <a:t>Most Common Language in the Antarctic: English</a:t>
             </a:r>
           </a:p>
         </p:txBody>
@@ -17142,10 +17187,10 @@
       </p:grpSpPr>
       <p:pic>
         <p:nvPicPr>
-          <p:cNvPr id="2" name="Picture 1">
+          <p:cNvPr id="3" name="Picture 2">
             <a:extLst>
               <a:ext uri="{FF2B5EF4-FFF2-40B4-BE49-F238E27FC236}">
-                <a16:creationId xmlns:a16="http://schemas.microsoft.com/office/drawing/2014/main" id="{03DB0D98-6363-41E1-B09D-411B7BFE4A29}"/>
+                <a16:creationId xmlns:a16="http://schemas.microsoft.com/office/drawing/2014/main" id="{76D52324-9C35-195F-C77C-B58996F69245}"/>
               </a:ext>
             </a:extLst>
           </p:cNvPr>
@@ -17162,8 +17207,8 @@
         </p:blipFill>
         <p:spPr>
           <a:xfrm>
-            <a:off x="272450" y="0"/>
-            <a:ext cx="6657409" cy="2536156"/>
+            <a:off x="0" y="2536156"/>
+            <a:ext cx="7818455" cy="2695182"/>
           </a:xfrm>
           <a:prstGeom prst="rect">
             <a:avLst/>
@@ -17172,10 +17217,10 @@
       </p:pic>
       <p:pic>
         <p:nvPicPr>
-          <p:cNvPr id="3" name="Picture 2">
+          <p:cNvPr id="2" name="Picture 1">
             <a:extLst>
               <a:ext uri="{FF2B5EF4-FFF2-40B4-BE49-F238E27FC236}">
-                <a16:creationId xmlns:a16="http://schemas.microsoft.com/office/drawing/2014/main" id="{76D52324-9C35-195F-C77C-B58996F69245}"/>
+                <a16:creationId xmlns:a16="http://schemas.microsoft.com/office/drawing/2014/main" id="{03DB0D98-6363-41E1-B09D-411B7BFE4A29}"/>
               </a:ext>
             </a:extLst>
           </p:cNvPr>
@@ -17192,8 +17237,8 @@
         </p:blipFill>
         <p:spPr>
           <a:xfrm>
-            <a:off x="0" y="2536156"/>
-            <a:ext cx="7818455" cy="2695182"/>
+            <a:off x="272450" y="0"/>
+            <a:ext cx="6657409" cy="2536156"/>
           </a:xfrm>
           <a:prstGeom prst="rect">
             <a:avLst/>

</xml_diff>